<commit_message>
updated spanish and english slides. updated language from master slide to Instructor slides
</commit_message>
<xml_diff>
--- a/Counter_Malign_Information/4-Implement-For_Instructors/Lesson_Plans/Lesson_01-Creating_Synthetic_Content/Audio_Visual-Template/En-Lesson_Slide-Create_AI_Content.pptx
+++ b/Counter_Malign_Information/4-Implement-For_Instructors/Lesson_Plans/Lesson_01-Creating_Synthetic_Content/Audio_Visual-Template/En-Lesson_Slide-Create_AI_Content.pptx
@@ -2270,7 +2270,7 @@
           </a:ln>
           <a:extLst>
             <a:ext uri="{C572A759-6A51-4108-AA02-DFA0A04FC94B}">
-              <ma14:wrappingTextBoxFlag xmlns="" xmlns:m="http://schemas.openxmlformats.org/officeDocument/2006/math" xmlns:a14="http://schemas.microsoft.com/office/drawing/2010/main" xmlns:ma14="http://schemas.microsoft.com/office/mac/drawingml/2011/main" val="1"/>
+              <ma14:wrappingTextBoxFlag xmlns:ma14="http://schemas.microsoft.com/office/mac/drawingml/2011/main" xmlns:a14="http://schemas.microsoft.com/office/drawing/2010/main" xmlns:m="http://schemas.openxmlformats.org/officeDocument/2006/math" xmlns="" val="1"/>
             </a:ext>
           </a:extLst>
         </p:spPr>
@@ -2309,7 +2309,7 @@
           </a:ln>
           <a:extLst>
             <a:ext uri="{C572A759-6A51-4108-AA02-DFA0A04FC94B}">
-              <ma14:wrappingTextBoxFlag xmlns="" xmlns:m="http://schemas.openxmlformats.org/officeDocument/2006/math" xmlns:a14="http://schemas.microsoft.com/office/drawing/2010/main" xmlns:ma14="http://schemas.microsoft.com/office/mac/drawingml/2011/main" val="1"/>
+              <ma14:wrappingTextBoxFlag xmlns:ma14="http://schemas.microsoft.com/office/mac/drawingml/2011/main" xmlns:a14="http://schemas.microsoft.com/office/drawing/2010/main" xmlns:m="http://schemas.openxmlformats.org/officeDocument/2006/math" xmlns="" val="1"/>
             </a:ext>
           </a:extLst>
         </p:spPr>
@@ -3340,7 +3340,7 @@
           </a:prstGeom>
           <a:extLst>
             <a:ext uri="{C572A759-6A51-4108-AA02-DFA0A04FC94B}">
-              <ma14:wrappingTextBoxFlag xmlns="" xmlns:m="http://schemas.openxmlformats.org/officeDocument/2006/math" xmlns:a14="http://schemas.microsoft.com/office/drawing/2010/main" xmlns:ma14="http://schemas.microsoft.com/office/mac/drawingml/2011/main" val="1"/>
+              <ma14:wrappingTextBoxFlag xmlns:ma14="http://schemas.microsoft.com/office/mac/drawingml/2011/main" xmlns:a14="http://schemas.microsoft.com/office/drawing/2010/main" xmlns:m="http://schemas.openxmlformats.org/officeDocument/2006/math" xmlns="" val="1"/>
             </a:ext>
           </a:extLst>
         </p:spPr>
@@ -3565,7 +3565,7 @@
           </a:prstGeom>
           <a:extLst>
             <a:ext uri="{C572A759-6A51-4108-AA02-DFA0A04FC94B}">
-              <ma14:wrappingTextBoxFlag xmlns="" xmlns:m="http://schemas.openxmlformats.org/officeDocument/2006/math" xmlns:a14="http://schemas.microsoft.com/office/drawing/2010/main" xmlns:ma14="http://schemas.microsoft.com/office/mac/drawingml/2011/main" val="1"/>
+              <ma14:wrappingTextBoxFlag xmlns:ma14="http://schemas.microsoft.com/office/mac/drawingml/2011/main" xmlns:a14="http://schemas.microsoft.com/office/drawing/2010/main" xmlns:m="http://schemas.openxmlformats.org/officeDocument/2006/math" xmlns="" val="1"/>
             </a:ext>
           </a:extLst>
         </p:spPr>
@@ -3701,7 +3701,7 @@
           </a:ln>
           <a:extLst>
             <a:ext uri="{C572A759-6A51-4108-AA02-DFA0A04FC94B}">
-              <ma14:wrappingTextBoxFlag xmlns="" xmlns:m="http://schemas.openxmlformats.org/officeDocument/2006/math" xmlns:a14="http://schemas.microsoft.com/office/drawing/2010/main" xmlns:ma14="http://schemas.microsoft.com/office/mac/drawingml/2011/main" val="1"/>
+              <ma14:wrappingTextBoxFlag xmlns:ma14="http://schemas.microsoft.com/office/mac/drawingml/2011/main" xmlns:a14="http://schemas.microsoft.com/office/drawing/2010/main" xmlns:m="http://schemas.openxmlformats.org/officeDocument/2006/math" xmlns="" val="1"/>
             </a:ext>
           </a:extLst>
         </p:spPr>
@@ -3737,7 +3737,7 @@
           </a:prstGeom>
           <a:extLst>
             <a:ext uri="{C572A759-6A51-4108-AA02-DFA0A04FC94B}">
-              <ma14:wrappingTextBoxFlag xmlns="" xmlns:m="http://schemas.openxmlformats.org/officeDocument/2006/math" xmlns:a14="http://schemas.microsoft.com/office/drawing/2010/main" xmlns:ma14="http://schemas.microsoft.com/office/mac/drawingml/2011/main" val="1"/>
+              <ma14:wrappingTextBoxFlag xmlns:ma14="http://schemas.microsoft.com/office/mac/drawingml/2011/main" xmlns:a14="http://schemas.microsoft.com/office/drawing/2010/main" xmlns:m="http://schemas.openxmlformats.org/officeDocument/2006/math" xmlns="" val="1"/>
             </a:ext>
           </a:extLst>
         </p:spPr>
@@ -3763,7 +3763,7 @@
         <p:push dir="u"/>
       </p:transition>
     </mc:Choice>
-    <mc:Fallback xmlns="" xmlns:m="http://schemas.openxmlformats.org/officeDocument/2006/math" xmlns:a14="http://schemas.microsoft.com/office/drawing/2010/main">
+    <mc:Fallback xmlns:a14="http://schemas.microsoft.com/office/drawing/2010/main" xmlns:m="http://schemas.openxmlformats.org/officeDocument/2006/math" xmlns="">
       <p:transition spd="slow">
         <p:fade/>
       </p:transition>
@@ -4123,7 +4123,7 @@
           </a:prstGeom>
           <a:extLst>
             <a:ext uri="{C572A759-6A51-4108-AA02-DFA0A04FC94B}">
-              <ma14:wrappingTextBoxFlag xmlns="" xmlns:m="http://schemas.openxmlformats.org/officeDocument/2006/math" xmlns:a14="http://schemas.microsoft.com/office/drawing/2010/main" xmlns:ma14="http://schemas.microsoft.com/office/mac/drawingml/2011/main" val="1"/>
+              <ma14:wrappingTextBoxFlag xmlns:ma14="http://schemas.microsoft.com/office/mac/drawingml/2011/main" xmlns:a14="http://schemas.microsoft.com/office/drawing/2010/main" xmlns:m="http://schemas.openxmlformats.org/officeDocument/2006/math" xmlns="" val="1"/>
             </a:ext>
           </a:extLst>
         </p:spPr>
@@ -4166,7 +4166,7 @@
           </a:ln>
           <a:extLst>
             <a:ext uri="{C572A759-6A51-4108-AA02-DFA0A04FC94B}">
-              <ma14:wrappingTextBoxFlag xmlns="" xmlns:m="http://schemas.openxmlformats.org/officeDocument/2006/math" xmlns:a14="http://schemas.microsoft.com/office/drawing/2010/main" xmlns:ma14="http://schemas.microsoft.com/office/mac/drawingml/2011/main" val="1"/>
+              <ma14:wrappingTextBoxFlag xmlns:ma14="http://schemas.microsoft.com/office/mac/drawingml/2011/main" xmlns:a14="http://schemas.microsoft.com/office/drawing/2010/main" xmlns:m="http://schemas.openxmlformats.org/officeDocument/2006/math" xmlns="" val="1"/>
             </a:ext>
           </a:extLst>
         </p:spPr>
@@ -4567,7 +4567,7 @@
           </a:prstGeom>
           <a:extLst>
             <a:ext uri="{C572A759-6A51-4108-AA02-DFA0A04FC94B}">
-              <ma14:wrappingTextBoxFlag xmlns="" xmlns:m="http://schemas.openxmlformats.org/officeDocument/2006/math" xmlns:a14="http://schemas.microsoft.com/office/drawing/2010/main" xmlns:ma14="http://schemas.microsoft.com/office/mac/drawingml/2011/main" val="1"/>
+              <ma14:wrappingTextBoxFlag xmlns:ma14="http://schemas.microsoft.com/office/mac/drawingml/2011/main" xmlns:a14="http://schemas.microsoft.com/office/drawing/2010/main" xmlns:m="http://schemas.openxmlformats.org/officeDocument/2006/math" xmlns="" val="1"/>
             </a:ext>
           </a:extLst>
         </p:spPr>
@@ -4614,7 +4614,7 @@
           </a:ln>
           <a:extLst>
             <a:ext uri="{C572A759-6A51-4108-AA02-DFA0A04FC94B}">
-              <ma14:wrappingTextBoxFlag xmlns="" xmlns:m="http://schemas.openxmlformats.org/officeDocument/2006/math" xmlns:a14="http://schemas.microsoft.com/office/drawing/2010/main" xmlns:ma14="http://schemas.microsoft.com/office/mac/drawingml/2011/main" val="1"/>
+              <ma14:wrappingTextBoxFlag xmlns:ma14="http://schemas.microsoft.com/office/mac/drawingml/2011/main" xmlns:a14="http://schemas.microsoft.com/office/drawing/2010/main" xmlns:m="http://schemas.openxmlformats.org/officeDocument/2006/math" xmlns="" val="1"/>
             </a:ext>
           </a:extLst>
         </p:spPr>
@@ -4687,7 +4687,7 @@
           </a:ln>
           <a:extLst>
             <a:ext uri="{C572A759-6A51-4108-AA02-DFA0A04FC94B}">
-              <ma14:wrappingTextBoxFlag xmlns="" xmlns:m="http://schemas.openxmlformats.org/officeDocument/2006/math" xmlns:a14="http://schemas.microsoft.com/office/drawing/2010/main" xmlns:ma14="http://schemas.microsoft.com/office/mac/drawingml/2011/main" val="1"/>
+              <ma14:wrappingTextBoxFlag xmlns:ma14="http://schemas.microsoft.com/office/mac/drawingml/2011/main" xmlns:a14="http://schemas.microsoft.com/office/drawing/2010/main" xmlns:m="http://schemas.openxmlformats.org/officeDocument/2006/math" xmlns="" val="1"/>
             </a:ext>
           </a:extLst>
         </p:spPr>
@@ -4756,7 +4756,7 @@
           </a:ln>
           <a:extLst>
             <a:ext uri="{C572A759-6A51-4108-AA02-DFA0A04FC94B}">
-              <ma14:wrappingTextBoxFlag xmlns="" xmlns:m="http://schemas.openxmlformats.org/officeDocument/2006/math" xmlns:a14="http://schemas.microsoft.com/office/drawing/2010/main" xmlns:ma14="http://schemas.microsoft.com/office/mac/drawingml/2011/main" val="1"/>
+              <ma14:wrappingTextBoxFlag xmlns:ma14="http://schemas.microsoft.com/office/mac/drawingml/2011/main" xmlns:a14="http://schemas.microsoft.com/office/drawing/2010/main" xmlns:m="http://schemas.openxmlformats.org/officeDocument/2006/math" xmlns="" val="1"/>
             </a:ext>
           </a:extLst>
         </p:spPr>
@@ -4965,7 +4965,7 @@
           </a:prstGeom>
           <a:extLst>
             <a:ext uri="{C572A759-6A51-4108-AA02-DFA0A04FC94B}">
-              <ma14:wrappingTextBoxFlag xmlns:ma14="http://schemas.microsoft.com/office/mac/drawingml/2011/main" xmlns:a14="http://schemas.microsoft.com/office/drawing/2010/main" xmlns:m="http://schemas.openxmlformats.org/officeDocument/2006/math" xmlns="" val="1"/>
+              <ma14:wrappingTextBoxFlag xmlns="" xmlns:m="http://schemas.openxmlformats.org/officeDocument/2006/math" xmlns:a14="http://schemas.microsoft.com/office/drawing/2010/main" xmlns:ma14="http://schemas.microsoft.com/office/mac/drawingml/2011/main" val="1"/>
             </a:ext>
           </a:extLst>
         </p:spPr>
@@ -5012,7 +5012,7 @@
           </a:ln>
           <a:extLst>
             <a:ext uri="{C572A759-6A51-4108-AA02-DFA0A04FC94B}">
-              <ma14:wrappingTextBoxFlag xmlns:ma14="http://schemas.microsoft.com/office/mac/drawingml/2011/main" xmlns:a14="http://schemas.microsoft.com/office/drawing/2010/main" xmlns:m="http://schemas.openxmlformats.org/officeDocument/2006/math" xmlns="" val="1"/>
+              <ma14:wrappingTextBoxFlag xmlns="" xmlns:m="http://schemas.openxmlformats.org/officeDocument/2006/math" xmlns:a14="http://schemas.microsoft.com/office/drawing/2010/main" xmlns:ma14="http://schemas.microsoft.com/office/mac/drawingml/2011/main" val="1"/>
             </a:ext>
           </a:extLst>
         </p:spPr>
@@ -5085,7 +5085,7 @@
           </a:ln>
           <a:extLst>
             <a:ext uri="{C572A759-6A51-4108-AA02-DFA0A04FC94B}">
-              <ma14:wrappingTextBoxFlag xmlns:ma14="http://schemas.microsoft.com/office/mac/drawingml/2011/main" xmlns:a14="http://schemas.microsoft.com/office/drawing/2010/main" xmlns:m="http://schemas.openxmlformats.org/officeDocument/2006/math" xmlns="" val="1"/>
+              <ma14:wrappingTextBoxFlag xmlns="" xmlns:m="http://schemas.openxmlformats.org/officeDocument/2006/math" xmlns:a14="http://schemas.microsoft.com/office/drawing/2010/main" xmlns:ma14="http://schemas.microsoft.com/office/mac/drawingml/2011/main" val="1"/>
             </a:ext>
           </a:extLst>
         </p:spPr>
@@ -5154,7 +5154,7 @@
           </a:ln>
           <a:extLst>
             <a:ext uri="{C572A759-6A51-4108-AA02-DFA0A04FC94B}">
-              <ma14:wrappingTextBoxFlag xmlns:ma14="http://schemas.microsoft.com/office/mac/drawingml/2011/main" xmlns:a14="http://schemas.microsoft.com/office/drawing/2010/main" xmlns:m="http://schemas.openxmlformats.org/officeDocument/2006/math" xmlns="" val="1"/>
+              <ma14:wrappingTextBoxFlag xmlns="" xmlns:m="http://schemas.openxmlformats.org/officeDocument/2006/math" xmlns:a14="http://schemas.microsoft.com/office/drawing/2010/main" xmlns:ma14="http://schemas.microsoft.com/office/mac/drawingml/2011/main" val="1"/>
             </a:ext>
           </a:extLst>
         </p:spPr>
@@ -5378,7 +5378,7 @@
           </a:prstGeom>
           <a:extLst>
             <a:ext uri="{C572A759-6A51-4108-AA02-DFA0A04FC94B}">
-              <ma14:wrappingTextBoxFlag xmlns="" xmlns:m="http://schemas.openxmlformats.org/officeDocument/2006/math" xmlns:a14="http://schemas.microsoft.com/office/drawing/2010/main" xmlns:ma14="http://schemas.microsoft.com/office/mac/drawingml/2011/main" val="1"/>
+              <ma14:wrappingTextBoxFlag xmlns:ma14="http://schemas.microsoft.com/office/mac/drawingml/2011/main" xmlns:a14="http://schemas.microsoft.com/office/drawing/2010/main" xmlns:m="http://schemas.openxmlformats.org/officeDocument/2006/math" xmlns="" val="1"/>
             </a:ext>
           </a:extLst>
         </p:spPr>
@@ -5425,7 +5425,7 @@
           </a:ln>
           <a:extLst>
             <a:ext uri="{C572A759-6A51-4108-AA02-DFA0A04FC94B}">
-              <ma14:wrappingTextBoxFlag xmlns="" xmlns:m="http://schemas.openxmlformats.org/officeDocument/2006/math" xmlns:a14="http://schemas.microsoft.com/office/drawing/2010/main" xmlns:ma14="http://schemas.microsoft.com/office/mac/drawingml/2011/main" val="1"/>
+              <ma14:wrappingTextBoxFlag xmlns:ma14="http://schemas.microsoft.com/office/mac/drawingml/2011/main" xmlns:a14="http://schemas.microsoft.com/office/drawing/2010/main" xmlns:m="http://schemas.openxmlformats.org/officeDocument/2006/math" xmlns="" val="1"/>
             </a:ext>
           </a:extLst>
         </p:spPr>
@@ -5498,7 +5498,7 @@
           </a:ln>
           <a:extLst>
             <a:ext uri="{C572A759-6A51-4108-AA02-DFA0A04FC94B}">
-              <ma14:wrappingTextBoxFlag xmlns="" xmlns:m="http://schemas.openxmlformats.org/officeDocument/2006/math" xmlns:a14="http://schemas.microsoft.com/office/drawing/2010/main" xmlns:ma14="http://schemas.microsoft.com/office/mac/drawingml/2011/main" val="1"/>
+              <ma14:wrappingTextBoxFlag xmlns:ma14="http://schemas.microsoft.com/office/mac/drawingml/2011/main" xmlns:a14="http://schemas.microsoft.com/office/drawing/2010/main" xmlns:m="http://schemas.openxmlformats.org/officeDocument/2006/math" xmlns="" val="1"/>
             </a:ext>
           </a:extLst>
         </p:spPr>
@@ -5567,7 +5567,7 @@
           </a:ln>
           <a:extLst>
             <a:ext uri="{C572A759-6A51-4108-AA02-DFA0A04FC94B}">
-              <ma14:wrappingTextBoxFlag xmlns="" xmlns:m="http://schemas.openxmlformats.org/officeDocument/2006/math" xmlns:a14="http://schemas.microsoft.com/office/drawing/2010/main" xmlns:ma14="http://schemas.microsoft.com/office/mac/drawingml/2011/main" val="1"/>
+              <ma14:wrappingTextBoxFlag xmlns:ma14="http://schemas.microsoft.com/office/mac/drawingml/2011/main" xmlns:a14="http://schemas.microsoft.com/office/drawing/2010/main" xmlns:m="http://schemas.openxmlformats.org/officeDocument/2006/math" xmlns="" val="1"/>
             </a:ext>
           </a:extLst>
         </p:spPr>
@@ -5792,7 +5792,7 @@
           </a:prstGeom>
           <a:extLst>
             <a:ext uri="{C572A759-6A51-4108-AA02-DFA0A04FC94B}">
-              <ma14:wrappingTextBoxFlag xmlns="" xmlns:m="http://schemas.openxmlformats.org/officeDocument/2006/math" xmlns:a14="http://schemas.microsoft.com/office/drawing/2010/main" xmlns:ma14="http://schemas.microsoft.com/office/mac/drawingml/2011/main" val="1"/>
+              <ma14:wrappingTextBoxFlag xmlns:ma14="http://schemas.microsoft.com/office/mac/drawingml/2011/main" xmlns:a14="http://schemas.microsoft.com/office/drawing/2010/main" xmlns:m="http://schemas.openxmlformats.org/officeDocument/2006/math" xmlns="" val="1"/>
             </a:ext>
           </a:extLst>
         </p:spPr>
@@ -5839,7 +5839,7 @@
           </a:ln>
           <a:extLst>
             <a:ext uri="{C572A759-6A51-4108-AA02-DFA0A04FC94B}">
-              <ma14:wrappingTextBoxFlag xmlns="" xmlns:m="http://schemas.openxmlformats.org/officeDocument/2006/math" xmlns:a14="http://schemas.microsoft.com/office/drawing/2010/main" xmlns:ma14="http://schemas.microsoft.com/office/mac/drawingml/2011/main" val="1"/>
+              <ma14:wrappingTextBoxFlag xmlns:ma14="http://schemas.microsoft.com/office/mac/drawingml/2011/main" xmlns:a14="http://schemas.microsoft.com/office/drawing/2010/main" xmlns:m="http://schemas.openxmlformats.org/officeDocument/2006/math" xmlns="" val="1"/>
             </a:ext>
           </a:extLst>
         </p:spPr>
@@ -5912,7 +5912,7 @@
           </a:ln>
           <a:extLst>
             <a:ext uri="{C572A759-6A51-4108-AA02-DFA0A04FC94B}">
-              <ma14:wrappingTextBoxFlag xmlns="" xmlns:m="http://schemas.openxmlformats.org/officeDocument/2006/math" xmlns:a14="http://schemas.microsoft.com/office/drawing/2010/main" xmlns:ma14="http://schemas.microsoft.com/office/mac/drawingml/2011/main" val="1"/>
+              <ma14:wrappingTextBoxFlag xmlns:ma14="http://schemas.microsoft.com/office/mac/drawingml/2011/main" xmlns:a14="http://schemas.microsoft.com/office/drawing/2010/main" xmlns:m="http://schemas.openxmlformats.org/officeDocument/2006/math" xmlns="" val="1"/>
             </a:ext>
           </a:extLst>
         </p:spPr>
@@ -5981,7 +5981,7 @@
           </a:ln>
           <a:extLst>
             <a:ext uri="{C572A759-6A51-4108-AA02-DFA0A04FC94B}">
-              <ma14:wrappingTextBoxFlag xmlns="" xmlns:m="http://schemas.openxmlformats.org/officeDocument/2006/math" xmlns:a14="http://schemas.microsoft.com/office/drawing/2010/main" xmlns:ma14="http://schemas.microsoft.com/office/mac/drawingml/2011/main" val="1"/>
+              <ma14:wrappingTextBoxFlag xmlns:ma14="http://schemas.microsoft.com/office/mac/drawingml/2011/main" xmlns:a14="http://schemas.microsoft.com/office/drawing/2010/main" xmlns:m="http://schemas.openxmlformats.org/officeDocument/2006/math" xmlns="" val="1"/>
             </a:ext>
           </a:extLst>
         </p:spPr>
@@ -6212,7 +6212,7 @@
           </a:prstGeom>
           <a:extLst>
             <a:ext uri="{C572A759-6A51-4108-AA02-DFA0A04FC94B}">
-              <ma14:wrappingTextBoxFlag xmlns="" xmlns:m="http://schemas.openxmlformats.org/officeDocument/2006/math" xmlns:a14="http://schemas.microsoft.com/office/drawing/2010/main" xmlns:ma14="http://schemas.microsoft.com/office/mac/drawingml/2011/main" val="1"/>
+              <ma14:wrappingTextBoxFlag xmlns:ma14="http://schemas.microsoft.com/office/mac/drawingml/2011/main" xmlns:a14="http://schemas.microsoft.com/office/drawing/2010/main" xmlns:m="http://schemas.openxmlformats.org/officeDocument/2006/math" xmlns="" val="1"/>
             </a:ext>
           </a:extLst>
         </p:spPr>
@@ -6259,7 +6259,7 @@
           </a:ln>
           <a:extLst>
             <a:ext uri="{C572A759-6A51-4108-AA02-DFA0A04FC94B}">
-              <ma14:wrappingTextBoxFlag xmlns="" xmlns:m="http://schemas.openxmlformats.org/officeDocument/2006/math" xmlns:a14="http://schemas.microsoft.com/office/drawing/2010/main" xmlns:ma14="http://schemas.microsoft.com/office/mac/drawingml/2011/main" val="1"/>
+              <ma14:wrappingTextBoxFlag xmlns:ma14="http://schemas.microsoft.com/office/mac/drawingml/2011/main" xmlns:a14="http://schemas.microsoft.com/office/drawing/2010/main" xmlns:m="http://schemas.openxmlformats.org/officeDocument/2006/math" xmlns="" val="1"/>
             </a:ext>
           </a:extLst>
         </p:spPr>
@@ -6332,7 +6332,7 @@
           </a:ln>
           <a:extLst>
             <a:ext uri="{C572A759-6A51-4108-AA02-DFA0A04FC94B}">
-              <ma14:wrappingTextBoxFlag xmlns="" xmlns:m="http://schemas.openxmlformats.org/officeDocument/2006/math" xmlns:a14="http://schemas.microsoft.com/office/drawing/2010/main" xmlns:ma14="http://schemas.microsoft.com/office/mac/drawingml/2011/main" val="1"/>
+              <ma14:wrappingTextBoxFlag xmlns:ma14="http://schemas.microsoft.com/office/mac/drawingml/2011/main" xmlns:a14="http://schemas.microsoft.com/office/drawing/2010/main" xmlns:m="http://schemas.openxmlformats.org/officeDocument/2006/math" xmlns="" val="1"/>
             </a:ext>
           </a:extLst>
         </p:spPr>
@@ -6401,7 +6401,7 @@
           </a:ln>
           <a:extLst>
             <a:ext uri="{C572A759-6A51-4108-AA02-DFA0A04FC94B}">
-              <ma14:wrappingTextBoxFlag xmlns="" xmlns:m="http://schemas.openxmlformats.org/officeDocument/2006/math" xmlns:a14="http://schemas.microsoft.com/office/drawing/2010/main" xmlns:ma14="http://schemas.microsoft.com/office/mac/drawingml/2011/main" val="1"/>
+              <ma14:wrappingTextBoxFlag xmlns:ma14="http://schemas.microsoft.com/office/mac/drawingml/2011/main" xmlns:a14="http://schemas.microsoft.com/office/drawing/2010/main" xmlns:m="http://schemas.openxmlformats.org/officeDocument/2006/math" xmlns="" val="1"/>
             </a:ext>
           </a:extLst>
         </p:spPr>
@@ -6497,7 +6497,7 @@
           </a:prstGeom>
           <a:extLst>
             <a:ext uri="{C572A759-6A51-4108-AA02-DFA0A04FC94B}">
-              <ma14:wrappingTextBoxFlag xmlns:ma14="http://schemas.microsoft.com/office/mac/drawingml/2011/main" xmlns:a14="http://schemas.microsoft.com/office/drawing/2010/main" xmlns:m="http://schemas.openxmlformats.org/officeDocument/2006/math" xmlns="" val="1"/>
+              <ma14:wrappingTextBoxFlag xmlns="" xmlns:m="http://schemas.openxmlformats.org/officeDocument/2006/math" xmlns:a14="http://schemas.microsoft.com/office/drawing/2010/main" xmlns:ma14="http://schemas.microsoft.com/office/mac/drawingml/2011/main" val="1"/>
             </a:ext>
           </a:extLst>
         </p:spPr>
@@ -7165,7 +7165,7 @@
           </a:ln>
           <a:extLst>
             <a:ext uri="{C572A759-6A51-4108-AA02-DFA0A04FC94B}">
-              <ma14:wrappingTextBoxFlag xmlns:ma14="http://schemas.microsoft.com/office/mac/drawingml/2011/main" xmlns:a14="http://schemas.microsoft.com/office/drawing/2010/main" xmlns:m="http://schemas.openxmlformats.org/officeDocument/2006/math" xmlns="" val="1"/>
+              <ma14:wrappingTextBoxFlag xmlns="" xmlns:m="http://schemas.openxmlformats.org/officeDocument/2006/math" xmlns:a14="http://schemas.microsoft.com/office/drawing/2010/main" xmlns:ma14="http://schemas.microsoft.com/office/mac/drawingml/2011/main" val="1"/>
             </a:ext>
           </a:extLst>
         </p:spPr>
@@ -7499,7 +7499,7 @@
           </a:ln>
           <a:extLst>
             <a:ext uri="{C572A759-6A51-4108-AA02-DFA0A04FC94B}">
-              <ma14:wrappingTextBoxFlag xmlns:ma14="http://schemas.microsoft.com/office/mac/drawingml/2011/main" xmlns:a14="http://schemas.microsoft.com/office/drawing/2010/main" xmlns:m="http://schemas.openxmlformats.org/officeDocument/2006/math" xmlns="" val="1"/>
+              <ma14:wrappingTextBoxFlag xmlns="" xmlns:m="http://schemas.openxmlformats.org/officeDocument/2006/math" xmlns:a14="http://schemas.microsoft.com/office/drawing/2010/main" xmlns:ma14="http://schemas.microsoft.com/office/mac/drawingml/2011/main" val="1"/>
             </a:ext>
           </a:extLst>
         </p:spPr>
@@ -7584,7 +7584,7 @@
           </a:prstGeom>
           <a:extLst>
             <a:ext uri="{C572A759-6A51-4108-AA02-DFA0A04FC94B}">
-              <ma14:wrappingTextBoxFlag xmlns:ma14="http://schemas.microsoft.com/office/mac/drawingml/2011/main" xmlns:a14="http://schemas.microsoft.com/office/drawing/2010/main" xmlns:m="http://schemas.openxmlformats.org/officeDocument/2006/math" xmlns="" val="1"/>
+              <ma14:wrappingTextBoxFlag xmlns="" xmlns:m="http://schemas.openxmlformats.org/officeDocument/2006/math" xmlns:a14="http://schemas.microsoft.com/office/drawing/2010/main" xmlns:ma14="http://schemas.microsoft.com/office/mac/drawingml/2011/main" val="1"/>
             </a:ext>
           </a:extLst>
         </p:spPr>
@@ -7906,7 +7906,7 @@
           </a:ln>
           <a:extLst>
             <a:ext uri="{C572A759-6A51-4108-AA02-DFA0A04FC94B}">
-              <ma14:wrappingTextBoxFlag xmlns:ma14="http://schemas.microsoft.com/office/mac/drawingml/2011/main" xmlns:a14="http://schemas.microsoft.com/office/drawing/2010/main" xmlns:m="http://schemas.openxmlformats.org/officeDocument/2006/math" xmlns="" val="1"/>
+              <ma14:wrappingTextBoxFlag xmlns="" xmlns:m="http://schemas.openxmlformats.org/officeDocument/2006/math" xmlns:a14="http://schemas.microsoft.com/office/drawing/2010/main" xmlns:ma14="http://schemas.microsoft.com/office/mac/drawingml/2011/main" val="1"/>
             </a:ext>
           </a:extLst>
         </p:spPr>
@@ -8150,7 +8150,7 @@
           </a:ln>
           <a:extLst>
             <a:ext uri="{C572A759-6A51-4108-AA02-DFA0A04FC94B}">
-              <ma14:wrappingTextBoxFlag xmlns:ma14="http://schemas.microsoft.com/office/mac/drawingml/2011/main" xmlns:a14="http://schemas.microsoft.com/office/drawing/2010/main" xmlns:m="http://schemas.openxmlformats.org/officeDocument/2006/math" xmlns="" val="1"/>
+              <ma14:wrappingTextBoxFlag xmlns="" xmlns:m="http://schemas.openxmlformats.org/officeDocument/2006/math" xmlns:a14="http://schemas.microsoft.com/office/drawing/2010/main" xmlns:ma14="http://schemas.microsoft.com/office/mac/drawingml/2011/main" val="1"/>
             </a:ext>
           </a:extLst>
         </p:spPr>

</xml_diff>